<commit_message>
updated icon for better readability
</commit_message>
<xml_diff>
--- a/Icon/NetMessageBanner.pptx
+++ b/Icon/NetMessageBanner.pptx
@@ -3328,10 +3328,10 @@
       </p:grpSpPr>
       <p:grpSp>
         <p:nvGrpSpPr>
-          <p:cNvPr id="6" name="Group 5">
-            <a:extLst>
-              <a:ext uri="{FF2B5EF4-FFF2-40B4-BE49-F238E27FC236}">
-                <a16:creationId xmlns:a16="http://schemas.microsoft.com/office/drawing/2014/main" id="{E17563FD-A3F6-39CF-4861-B2D507C065ED}"/>
+          <p:cNvPr id="13" name="Group 12">
+            <a:extLst>
+              <a:ext uri="{FF2B5EF4-FFF2-40B4-BE49-F238E27FC236}">
+                <a16:creationId xmlns:a16="http://schemas.microsoft.com/office/drawing/2014/main" id="{941514AB-CCD7-2F19-E295-8DB15BDC1F11}"/>
               </a:ext>
             </a:extLst>
           </p:cNvPr>
@@ -3340,18 +3340,122 @@
         </p:nvGrpSpPr>
         <p:grpSpPr>
           <a:xfrm>
-            <a:off x="2581503" y="1655483"/>
-            <a:ext cx="4611416" cy="769441"/>
-            <a:chOff x="2489166" y="1655483"/>
-            <a:chExt cx="4611416" cy="769441"/>
+            <a:off x="2073781" y="1655483"/>
+            <a:ext cx="5626861" cy="1459262"/>
+            <a:chOff x="2073781" y="1655483"/>
+            <a:chExt cx="5626861" cy="1459262"/>
           </a:xfrm>
         </p:grpSpPr>
+        <p:sp>
+          <p:nvSpPr>
+            <p:cNvPr id="2" name="TextBox 1">
+              <a:extLst>
+                <a:ext uri="{FF2B5EF4-FFF2-40B4-BE49-F238E27FC236}">
+                  <a16:creationId xmlns:a16="http://schemas.microsoft.com/office/drawing/2014/main" id="{860575A6-B37A-F0E5-AE2B-23DEF77EE96C}"/>
+                </a:ext>
+              </a:extLst>
+            </p:cNvPr>
+            <p:cNvSpPr txBox="1"/>
+            <p:nvPr/>
+          </p:nvSpPr>
+          <p:spPr>
+            <a:xfrm>
+              <a:off x="3550575" y="1655483"/>
+              <a:ext cx="3642344" cy="769441"/>
+            </a:xfrm>
+            <a:prstGeom prst="rect">
+              <a:avLst/>
+            </a:prstGeom>
+            <a:noFill/>
+          </p:spPr>
+          <p:txBody>
+            <a:bodyPr wrap="none" rtlCol="0">
+              <a:spAutoFit/>
+            </a:bodyPr>
+            <a:lstStyle/>
+            <a:p>
+              <a:r>
+                <a:rPr lang="en-US" sz="4400" b="1" dirty="0" err="1">
+                  <a:latin typeface="Open Sans" pitchFamily="2" charset="0"/>
+                  <a:ea typeface="Open Sans" pitchFamily="2" charset="0"/>
+                  <a:cs typeface="Open Sans" pitchFamily="2" charset="0"/>
+                </a:rPr>
+                <a:t>NetMessage</a:t>
+              </a:r>
+              <a:endParaRPr lang="en-US" sz="4400" b="1" dirty="0">
+                <a:latin typeface="Open Sans" pitchFamily="2" charset="0"/>
+                <a:ea typeface="Open Sans" pitchFamily="2" charset="0"/>
+                <a:cs typeface="Open Sans" pitchFamily="2" charset="0"/>
+              </a:endParaRPr>
+            </a:p>
+          </p:txBody>
+        </p:sp>
+        <p:sp>
+          <p:nvSpPr>
+            <p:cNvPr id="3" name="TextBox 2">
+              <a:extLst>
+                <a:ext uri="{FF2B5EF4-FFF2-40B4-BE49-F238E27FC236}">
+                  <a16:creationId xmlns:a16="http://schemas.microsoft.com/office/drawing/2014/main" id="{F6348CD6-5C55-643D-5237-D4DE7E480494}"/>
+                </a:ext>
+              </a:extLst>
+            </p:cNvPr>
+            <p:cNvSpPr txBox="1"/>
+            <p:nvPr/>
+          </p:nvSpPr>
+          <p:spPr>
+            <a:xfrm>
+              <a:off x="2073781" y="2653080"/>
+              <a:ext cx="5626861" cy="461665"/>
+            </a:xfrm>
+            <a:prstGeom prst="rect">
+              <a:avLst/>
+            </a:prstGeom>
+            <a:noFill/>
+          </p:spPr>
+          <p:txBody>
+            <a:bodyPr wrap="none" rtlCol="0">
+              <a:spAutoFit/>
+            </a:bodyPr>
+            <a:lstStyle/>
+            <a:p>
+              <a:r>
+                <a:rPr lang="en-US" sz="2400" b="0" i="0" dirty="0" err="1">
+                  <a:solidFill>
+                    <a:srgbClr val="24292F"/>
+                  </a:solidFill>
+                  <a:effectLst/>
+                  <a:latin typeface="Open Sans" pitchFamily="2" charset="0"/>
+                  <a:ea typeface="Open Sans" pitchFamily="2" charset="0"/>
+                  <a:cs typeface="Open Sans" pitchFamily="2" charset="0"/>
+                </a:rPr>
+                <a:t>Typesafe</a:t>
+              </a:r>
+              <a:r>
+                <a:rPr lang="en-US" sz="2400" b="0" i="0" dirty="0">
+                  <a:solidFill>
+                    <a:srgbClr val="24292F"/>
+                  </a:solidFill>
+                  <a:effectLst/>
+                  <a:latin typeface="Open Sans" pitchFamily="2" charset="0"/>
+                  <a:ea typeface="Open Sans" pitchFamily="2" charset="0"/>
+                  <a:cs typeface="Open Sans" pitchFamily="2" charset="0"/>
+                </a:rPr>
+                <a:t> and lightweight RPC for .NET</a:t>
+              </a:r>
+              <a:endParaRPr lang="en-US" sz="2400" dirty="0">
+                <a:latin typeface="Open Sans" pitchFamily="2" charset="0"/>
+                <a:ea typeface="Open Sans" pitchFamily="2" charset="0"/>
+                <a:cs typeface="Open Sans" pitchFamily="2" charset="0"/>
+              </a:endParaRPr>
+            </a:p>
+          </p:txBody>
+        </p:sp>
         <p:grpSp>
           <p:nvGrpSpPr>
-            <p:cNvPr id="10" name="Group 9">
+            <p:cNvPr id="7" name="Group 6">
               <a:extLst>
                 <a:ext uri="{FF2B5EF4-FFF2-40B4-BE49-F238E27FC236}">
-                  <a16:creationId xmlns:a16="http://schemas.microsoft.com/office/drawing/2014/main" id="{C40D4FB2-B24F-5D92-AC1E-C5CC6A1CEC2B}"/>
+                  <a16:creationId xmlns:a16="http://schemas.microsoft.com/office/drawing/2014/main" id="{9CB6221B-947F-DB84-1AD1-F8C320A6F16B}"/>
                 </a:ext>
               </a:extLst>
             </p:cNvPr>
@@ -3360,25 +3464,19 @@
           </p:nvGrpSpPr>
           <p:grpSpPr>
             <a:xfrm>
-              <a:off x="2489166" y="1758251"/>
+              <a:off x="2581503" y="1758251"/>
               <a:ext cx="857282" cy="565342"/>
               <a:chOff x="2470116" y="1758251"/>
               <a:chExt cx="857282" cy="565342"/>
             </a:xfrm>
-            <a:effectLst>
-              <a:outerShdw blurRad="50800" dist="38100" dir="2700000" algn="tl" rotWithShape="0">
-                <a:prstClr val="black">
-                  <a:alpha val="40000"/>
-                </a:prstClr>
-              </a:outerShdw>
-            </a:effectLst>
+            <a:effectLst/>
           </p:grpSpPr>
           <p:sp>
             <p:nvSpPr>
-              <p:cNvPr id="5" name="Speech Bubble: Oval 4">
+              <p:cNvPr id="8" name="Speech Bubble: Oval 7">
                 <a:extLst>
                   <a:ext uri="{FF2B5EF4-FFF2-40B4-BE49-F238E27FC236}">
-                    <a16:creationId xmlns:a16="http://schemas.microsoft.com/office/drawing/2014/main" id="{4C55757F-C5E0-7BBB-AA12-7C8DDB668E47}"/>
+                    <a16:creationId xmlns:a16="http://schemas.microsoft.com/office/drawing/2014/main" id="{FB0B15C8-49A7-97B5-B9CF-8C01AAED0C93}"/>
                   </a:ext>
                 </a:extLst>
               </p:cNvPr>
@@ -3403,9 +3501,8 @@
               </a:solidFill>
               <a:ln w="28575">
                 <a:solidFill>
-                  <a:schemeClr val="tx1">
+                  <a:schemeClr val="bg2">
                     <a:lumMod val="50000"/>
-                    <a:lumOff val="50000"/>
                   </a:schemeClr>
                 </a:solidFill>
               </a:ln>
@@ -3438,10 +3535,10 @@
           </p:sp>
           <p:sp>
             <p:nvSpPr>
-              <p:cNvPr id="9" name="Speech Bubble: Oval 8">
+              <p:cNvPr id="11" name="Speech Bubble: Oval 10">
                 <a:extLst>
                   <a:ext uri="{FF2B5EF4-FFF2-40B4-BE49-F238E27FC236}">
-                    <a16:creationId xmlns:a16="http://schemas.microsoft.com/office/drawing/2014/main" id="{6DE1783B-C6F7-6881-BE7C-97F7E96505FC}"/>
+                    <a16:creationId xmlns:a16="http://schemas.microsoft.com/office/drawing/2014/main" id="{F1EED637-42EF-4D2F-15B6-B38C3FC74861}"/>
                   </a:ext>
                 </a:extLst>
               </p:cNvPr>
@@ -3460,11 +3557,11 @@
                 </a:avLst>
               </a:prstGeom>
               <a:solidFill>
-                <a:srgbClr val="6D409D"/>
+                <a:srgbClr val="1E97EA"/>
               </a:solidFill>
               <a:ln w="28575">
                 <a:solidFill>
-                  <a:srgbClr val="5C2992"/>
+                  <a:schemeClr val="accent1"/>
                 </a:solidFill>
               </a:ln>
               <a:effectLst/>
@@ -3496,10 +3593,10 @@
           </p:sp>
           <p:sp>
             <p:nvSpPr>
-              <p:cNvPr id="4" name="Speech Bubble: Rectangle with Corners Rounded 3">
+              <p:cNvPr id="12" name="Speech Bubble: Rectangle 11">
                 <a:extLst>
                   <a:ext uri="{FF2B5EF4-FFF2-40B4-BE49-F238E27FC236}">
-                    <a16:creationId xmlns:a16="http://schemas.microsoft.com/office/drawing/2014/main" id="{05817F81-016B-82A9-7676-C8EFB43A0164}"/>
+                    <a16:creationId xmlns:a16="http://schemas.microsoft.com/office/drawing/2014/main" id="{23674405-6D1B-3D6D-1B09-0F71EA418AD1}"/>
                   </a:ext>
                 </a:extLst>
               </p:cNvPr>
@@ -3511,22 +3608,25 @@
                 <a:off x="2470116" y="1851279"/>
                 <a:ext cx="635034" cy="377851"/>
               </a:xfrm>
-              <a:prstGeom prst="wedgeRoundRectCallout">
+              <a:prstGeom prst="wedgeRectCallout">
                 <a:avLst>
-                  <a:gd name="adj1" fmla="val -33138"/>
-                  <a:gd name="adj2" fmla="val 97161"/>
-                  <a:gd name="adj3" fmla="val 16667"/>
+                  <a:gd name="adj1" fmla="val -33207"/>
+                  <a:gd name="adj2" fmla="val 106615"/>
                 </a:avLst>
               </a:prstGeom>
               <a:solidFill>
                 <a:srgbClr val="512BD4"/>
               </a:solidFill>
               <a:ln w="28575">
-                <a:solidFill>
-                  <a:srgbClr val="301A80"/>
-                </a:solidFill>
+                <a:noFill/>
               </a:ln>
-              <a:effectLst/>
+              <a:effectLst>
+                <a:glow rad="63500">
+                  <a:schemeClr val="bg1">
+                    <a:alpha val="65000"/>
+                  </a:schemeClr>
+                </a:glow>
+              </a:effectLst>
             </p:spPr>
             <p:style>
               <a:lnRef idx="2">
@@ -3550,122 +3650,18 @@
               <a:p>
                 <a:pPr algn="ctr"/>
                 <a:r>
-                  <a:rPr lang="en-US" dirty="0">
+                  <a:rPr lang="en-US" sz="2200" dirty="0">
                     <a:latin typeface="Open Sans" pitchFamily="2" charset="0"/>
                     <a:ea typeface="Open Sans" pitchFamily="2" charset="0"/>
                     <a:cs typeface="Open Sans" pitchFamily="2" charset="0"/>
                   </a:rPr>
-                  <a:t>NET</a:t>
+                  <a:t>Net</a:t>
                 </a:r>
               </a:p>
             </p:txBody>
           </p:sp>
         </p:grpSp>
-        <p:sp>
-          <p:nvSpPr>
-            <p:cNvPr id="2" name="TextBox 1">
-              <a:extLst>
-                <a:ext uri="{FF2B5EF4-FFF2-40B4-BE49-F238E27FC236}">
-                  <a16:creationId xmlns:a16="http://schemas.microsoft.com/office/drawing/2014/main" id="{860575A6-B37A-F0E5-AE2B-23DEF77EE96C}"/>
-                </a:ext>
-              </a:extLst>
-            </p:cNvPr>
-            <p:cNvSpPr txBox="1"/>
-            <p:nvPr/>
-          </p:nvSpPr>
-          <p:spPr>
-            <a:xfrm>
-              <a:off x="3458238" y="1655483"/>
-              <a:ext cx="3642344" cy="769441"/>
-            </a:xfrm>
-            <a:prstGeom prst="rect">
-              <a:avLst/>
-            </a:prstGeom>
-            <a:noFill/>
-          </p:spPr>
-          <p:txBody>
-            <a:bodyPr wrap="none" rtlCol="0">
-              <a:spAutoFit/>
-            </a:bodyPr>
-            <a:lstStyle/>
-            <a:p>
-              <a:r>
-                <a:rPr lang="en-US" sz="4400" b="1" dirty="0" err="1">
-                  <a:latin typeface="Open Sans" pitchFamily="2" charset="0"/>
-                  <a:ea typeface="Open Sans" pitchFamily="2" charset="0"/>
-                  <a:cs typeface="Open Sans" pitchFamily="2" charset="0"/>
-                </a:rPr>
-                <a:t>NetMessage</a:t>
-              </a:r>
-              <a:endParaRPr lang="en-US" sz="4400" b="1" dirty="0">
-                <a:latin typeface="Open Sans" pitchFamily="2" charset="0"/>
-                <a:ea typeface="Open Sans" pitchFamily="2" charset="0"/>
-                <a:cs typeface="Open Sans" pitchFamily="2" charset="0"/>
-              </a:endParaRPr>
-            </a:p>
-          </p:txBody>
-        </p:sp>
       </p:grpSp>
-      <p:sp>
-        <p:nvSpPr>
-          <p:cNvPr id="3" name="TextBox 2">
-            <a:extLst>
-              <a:ext uri="{FF2B5EF4-FFF2-40B4-BE49-F238E27FC236}">
-                <a16:creationId xmlns:a16="http://schemas.microsoft.com/office/drawing/2014/main" id="{F6348CD6-5C55-643D-5237-D4DE7E480494}"/>
-              </a:ext>
-            </a:extLst>
-          </p:cNvPr>
-          <p:cNvSpPr txBox="1"/>
-          <p:nvPr/>
-        </p:nvSpPr>
-        <p:spPr>
-          <a:xfrm>
-            <a:off x="2073781" y="2653080"/>
-            <a:ext cx="5626861" cy="461665"/>
-          </a:xfrm>
-          <a:prstGeom prst="rect">
-            <a:avLst/>
-          </a:prstGeom>
-          <a:noFill/>
-        </p:spPr>
-        <p:txBody>
-          <a:bodyPr wrap="none" rtlCol="0">
-            <a:spAutoFit/>
-          </a:bodyPr>
-          <a:lstStyle/>
-          <a:p>
-            <a:r>
-              <a:rPr lang="en-US" sz="2400" b="0" i="0" dirty="0" err="1">
-                <a:solidFill>
-                  <a:srgbClr val="24292F"/>
-                </a:solidFill>
-                <a:effectLst/>
-                <a:latin typeface="Open Sans" pitchFamily="2" charset="0"/>
-                <a:ea typeface="Open Sans" pitchFamily="2" charset="0"/>
-                <a:cs typeface="Open Sans" pitchFamily="2" charset="0"/>
-              </a:rPr>
-              <a:t>Typesafe</a:t>
-            </a:r>
-            <a:r>
-              <a:rPr lang="en-US" sz="2400" b="0" i="0" dirty="0">
-                <a:solidFill>
-                  <a:srgbClr val="24292F"/>
-                </a:solidFill>
-                <a:effectLst/>
-                <a:latin typeface="Open Sans" pitchFamily="2" charset="0"/>
-                <a:ea typeface="Open Sans" pitchFamily="2" charset="0"/>
-                <a:cs typeface="Open Sans" pitchFamily="2" charset="0"/>
-              </a:rPr>
-              <a:t> and lightweight RPC for .NET</a:t>
-            </a:r>
-            <a:endParaRPr lang="en-US" sz="2400" dirty="0">
-              <a:latin typeface="Open Sans" pitchFamily="2" charset="0"/>
-              <a:ea typeface="Open Sans" pitchFamily="2" charset="0"/>
-              <a:cs typeface="Open Sans" pitchFamily="2" charset="0"/>
-            </a:endParaRPr>
-          </a:p>
-        </p:txBody>
-      </p:sp>
     </p:spTree>
     <p:extLst>
       <p:ext uri="{BB962C8B-B14F-4D97-AF65-F5344CB8AC3E}">

</xml_diff>